<commit_message>
did powerpoint slides for presentation
</commit_message>
<xml_diff>
--- a/Project Specs/Max S part 3 algorithms.pptx
+++ b/Project Specs/Max S part 3 algorithms.pptx
@@ -6,6 +6,19 @@
   </p:sldMasterIdLst>
   <p:sldIdLst>
     <p:sldId id="256" r:id="rId2"/>
+    <p:sldId id="257" r:id="rId3"/>
+    <p:sldId id="258" r:id="rId4"/>
+    <p:sldId id="269" r:id="rId5"/>
+    <p:sldId id="259" r:id="rId6"/>
+    <p:sldId id="260" r:id="rId7"/>
+    <p:sldId id="261" r:id="rId8"/>
+    <p:sldId id="262" r:id="rId9"/>
+    <p:sldId id="263" r:id="rId10"/>
+    <p:sldId id="264" r:id="rId11"/>
+    <p:sldId id="265" r:id="rId12"/>
+    <p:sldId id="266" r:id="rId13"/>
+    <p:sldId id="267" r:id="rId14"/>
+    <p:sldId id="268" r:id="rId15"/>
   </p:sldIdLst>
   <p:sldSz cx="9144000" cy="6858000" type="screen4x3"/>
   <p:notesSz cx="6858000" cy="9144000"/>
@@ -219,7 +232,7 @@
             <a:fld id="{1D8BD707-D9CF-40AE-B4C6-C98DA3205C09}" type="datetimeFigureOut">
               <a:rPr lang="en-US" smtClean="0"/>
               <a:pPr/>
-              <a:t>10/27/2014</a:t>
+              <a:t>10/28/2014</a:t>
             </a:fld>
             <a:endParaRPr lang="en-US"/>
           </a:p>
@@ -447,7 +460,7 @@
             <a:fld id="{1D8BD707-D9CF-40AE-B4C6-C98DA3205C09}" type="datetimeFigureOut">
               <a:rPr lang="en-US" smtClean="0"/>
               <a:pPr/>
-              <a:t>10/27/2014</a:t>
+              <a:t>10/28/2014</a:t>
             </a:fld>
             <a:endParaRPr lang="en-US"/>
           </a:p>
@@ -624,7 +637,7 @@
             <a:fld id="{1D8BD707-D9CF-40AE-B4C6-C98DA3205C09}" type="datetimeFigureOut">
               <a:rPr lang="en-US" smtClean="0"/>
               <a:pPr/>
-              <a:t>10/27/2014</a:t>
+              <a:t>10/28/2014</a:t>
             </a:fld>
             <a:endParaRPr lang="en-US"/>
           </a:p>
@@ -791,7 +804,7 @@
             <a:fld id="{1D8BD707-D9CF-40AE-B4C6-C98DA3205C09}" type="datetimeFigureOut">
               <a:rPr lang="en-US" smtClean="0"/>
               <a:pPr/>
-              <a:t>10/27/2014</a:t>
+              <a:t>10/28/2014</a:t>
             </a:fld>
             <a:endParaRPr lang="en-US"/>
           </a:p>
@@ -1037,7 +1050,7 @@
             <a:fld id="{1D8BD707-D9CF-40AE-B4C6-C98DA3205C09}" type="datetimeFigureOut">
               <a:rPr lang="en-US" smtClean="0"/>
               <a:pPr/>
-              <a:t>10/27/2014</a:t>
+              <a:t>10/28/2014</a:t>
             </a:fld>
             <a:endParaRPr lang="en-US"/>
           </a:p>
@@ -1303,7 +1316,7 @@
             <a:fld id="{1D8BD707-D9CF-40AE-B4C6-C98DA3205C09}" type="datetimeFigureOut">
               <a:rPr lang="en-US" smtClean="0"/>
               <a:pPr/>
-              <a:t>10/27/2014</a:t>
+              <a:t>10/28/2014</a:t>
             </a:fld>
             <a:endParaRPr lang="en-US"/>
           </a:p>
@@ -1679,7 +1692,7 @@
             <a:fld id="{1D8BD707-D9CF-40AE-B4C6-C98DA3205C09}" type="datetimeFigureOut">
               <a:rPr lang="en-US" smtClean="0"/>
               <a:pPr/>
-              <a:t>10/27/2014</a:t>
+              <a:t>10/28/2014</a:t>
             </a:fld>
             <a:endParaRPr lang="en-US"/>
           </a:p>
@@ -1794,7 +1807,7 @@
             <a:fld id="{1D8BD707-D9CF-40AE-B4C6-C98DA3205C09}" type="datetimeFigureOut">
               <a:rPr lang="en-US" smtClean="0"/>
               <a:pPr/>
-              <a:t>10/27/2014</a:t>
+              <a:t>10/28/2014</a:t>
             </a:fld>
             <a:endParaRPr lang="en-US"/>
           </a:p>
@@ -1886,7 +1899,7 @@
             <a:fld id="{1D8BD707-D9CF-40AE-B4C6-C98DA3205C09}" type="datetimeFigureOut">
               <a:rPr lang="en-US" smtClean="0"/>
               <a:pPr/>
-              <a:t>10/27/2014</a:t>
+              <a:t>10/28/2014</a:t>
             </a:fld>
             <a:endParaRPr lang="en-US"/>
           </a:p>
@@ -2146,7 +2159,7 @@
             <a:fld id="{1D8BD707-D9CF-40AE-B4C6-C98DA3205C09}" type="datetimeFigureOut">
               <a:rPr lang="en-US" smtClean="0"/>
               <a:pPr/>
-              <a:t>10/27/2014</a:t>
+              <a:t>10/28/2014</a:t>
             </a:fld>
             <a:endParaRPr lang="en-US"/>
           </a:p>
@@ -2412,7 +2425,7 @@
             <a:fld id="{1D8BD707-D9CF-40AE-B4C6-C98DA3205C09}" type="datetimeFigureOut">
               <a:rPr lang="en-US" smtClean="0"/>
               <a:pPr/>
-              <a:t>10/27/2014</a:t>
+              <a:t>10/28/2014</a:t>
             </a:fld>
             <a:endParaRPr lang="en-US"/>
           </a:p>
@@ -2631,7 +2644,7 @@
             <a:fld id="{1D8BD707-D9CF-40AE-B4C6-C98DA3205C09}" type="datetimeFigureOut">
               <a:rPr lang="en-US" smtClean="0"/>
               <a:pPr/>
-              <a:t>10/27/2014</a:t>
+              <a:t>10/28/2014</a:t>
             </a:fld>
             <a:endParaRPr lang="en-US"/>
           </a:p>
@@ -3139,6 +3152,1027 @@
   <p:clrMapOvr>
     <a:masterClrMapping/>
   </p:clrMapOvr>
+  <p:timing>
+    <p:tnLst>
+      <p:par>
+        <p:cTn id="1" dur="indefinite" restart="never" nodeType="tmRoot"/>
+      </p:par>
+    </p:tnLst>
+  </p:timing>
+</p:sld>
+</file>
+
+<file path=ppt/slides/slide10.xml><?xml version="1.0" encoding="utf-8"?>
+<p:sld xmlns:a="http://schemas.openxmlformats.org/drawingml/2006/main" xmlns:r="http://schemas.openxmlformats.org/officeDocument/2006/relationships" xmlns:p="http://schemas.openxmlformats.org/presentationml/2006/main">
+  <p:cSld>
+    <p:spTree>
+      <p:nvGrpSpPr>
+        <p:cNvPr id="1" name=""/>
+        <p:cNvGrpSpPr/>
+        <p:nvPr/>
+      </p:nvGrpSpPr>
+      <p:grpSpPr>
+        <a:xfrm>
+          <a:off x="0" y="0"/>
+          <a:ext cx="0" cy="0"/>
+          <a:chOff x="0" y="0"/>
+          <a:chExt cx="0" cy="0"/>
+        </a:xfrm>
+      </p:grpSpPr>
+      <p:pic>
+        <p:nvPicPr>
+          <p:cNvPr id="8194" name="Picture 2" descr="C:\Users\MaxL\Desktop\New folder\slide8.png"/>
+          <p:cNvPicPr>
+            <a:picLocks noChangeAspect="1" noChangeArrowheads="1"/>
+          </p:cNvPicPr>
+          <p:nvPr/>
+        </p:nvPicPr>
+        <p:blipFill>
+          <a:blip r:embed="rId2">
+            <a:extLst>
+              <a:ext uri="{28A0092B-C50C-407E-A947-70E740481C1C}">
+                <a14:useLocalDpi xmlns:a14="http://schemas.microsoft.com/office/drawing/2010/main" val="0"/>
+              </a:ext>
+            </a:extLst>
+          </a:blip>
+          <a:srcRect/>
+          <a:stretch>
+            <a:fillRect/>
+          </a:stretch>
+        </p:blipFill>
+        <p:spPr bwMode="auto">
+          <a:xfrm>
+            <a:off x="914400" y="0"/>
+            <a:ext cx="6861629" cy="6851899"/>
+          </a:xfrm>
+          <a:prstGeom prst="rect">
+            <a:avLst/>
+          </a:prstGeom>
+          <a:noFill/>
+          <a:extLst>
+            <a:ext uri="{909E8E84-426E-40DD-AFC4-6F175D3DCCD1}">
+              <a14:hiddenFill xmlns:a14="http://schemas.microsoft.com/office/drawing/2010/main">
+                <a:solidFill>
+                  <a:srgbClr val="FFFFFF"/>
+                </a:solidFill>
+              </a14:hiddenFill>
+            </a:ext>
+          </a:extLst>
+        </p:spPr>
+      </p:pic>
+    </p:spTree>
+    <p:extLst>
+      <p:ext uri="{BB962C8B-B14F-4D97-AF65-F5344CB8AC3E}">
+        <p14:creationId xmlns:p14="http://schemas.microsoft.com/office/powerpoint/2010/main" val="2224659091"/>
+      </p:ext>
+    </p:extLst>
+  </p:cSld>
+  <p:clrMapOvr>
+    <a:masterClrMapping/>
+  </p:clrMapOvr>
+  <p:timing>
+    <p:tnLst>
+      <p:par>
+        <p:cTn id="1" dur="indefinite" restart="never" nodeType="tmRoot"/>
+      </p:par>
+    </p:tnLst>
+  </p:timing>
+</p:sld>
+</file>
+
+<file path=ppt/slides/slide11.xml><?xml version="1.0" encoding="utf-8"?>
+<p:sld xmlns:a="http://schemas.openxmlformats.org/drawingml/2006/main" xmlns:r="http://schemas.openxmlformats.org/officeDocument/2006/relationships" xmlns:p="http://schemas.openxmlformats.org/presentationml/2006/main">
+  <p:cSld>
+    <p:spTree>
+      <p:nvGrpSpPr>
+        <p:cNvPr id="1" name=""/>
+        <p:cNvGrpSpPr/>
+        <p:nvPr/>
+      </p:nvGrpSpPr>
+      <p:grpSpPr>
+        <a:xfrm>
+          <a:off x="0" y="0"/>
+          <a:ext cx="0" cy="0"/>
+          <a:chOff x="0" y="0"/>
+          <a:chExt cx="0" cy="0"/>
+        </a:xfrm>
+      </p:grpSpPr>
+      <p:pic>
+        <p:nvPicPr>
+          <p:cNvPr id="9218" name="Picture 2" descr="C:\Users\MaxL\Desktop\New folder\slide9.png"/>
+          <p:cNvPicPr>
+            <a:picLocks noChangeAspect="1" noChangeArrowheads="1"/>
+          </p:cNvPicPr>
+          <p:nvPr/>
+        </p:nvPicPr>
+        <p:blipFill>
+          <a:blip r:embed="rId2">
+            <a:extLst>
+              <a:ext uri="{28A0092B-C50C-407E-A947-70E740481C1C}">
+                <a14:useLocalDpi xmlns:a14="http://schemas.microsoft.com/office/drawing/2010/main" val="0"/>
+              </a:ext>
+            </a:extLst>
+          </a:blip>
+          <a:srcRect/>
+          <a:stretch>
+            <a:fillRect/>
+          </a:stretch>
+        </p:blipFill>
+        <p:spPr bwMode="auto">
+          <a:xfrm>
+            <a:off x="914400" y="0"/>
+            <a:ext cx="6896902" cy="6858000"/>
+          </a:xfrm>
+          <a:prstGeom prst="rect">
+            <a:avLst/>
+          </a:prstGeom>
+          <a:noFill/>
+          <a:extLst>
+            <a:ext uri="{909E8E84-426E-40DD-AFC4-6F175D3DCCD1}">
+              <a14:hiddenFill xmlns:a14="http://schemas.microsoft.com/office/drawing/2010/main">
+                <a:solidFill>
+                  <a:srgbClr val="FFFFFF"/>
+                </a:solidFill>
+              </a14:hiddenFill>
+            </a:ext>
+          </a:extLst>
+        </p:spPr>
+      </p:pic>
+    </p:spTree>
+    <p:extLst>
+      <p:ext uri="{BB962C8B-B14F-4D97-AF65-F5344CB8AC3E}">
+        <p14:creationId xmlns:p14="http://schemas.microsoft.com/office/powerpoint/2010/main" val="2224659091"/>
+      </p:ext>
+    </p:extLst>
+  </p:cSld>
+  <p:clrMapOvr>
+    <a:masterClrMapping/>
+  </p:clrMapOvr>
+  <p:timing>
+    <p:tnLst>
+      <p:par>
+        <p:cTn id="1" dur="indefinite" restart="never" nodeType="tmRoot"/>
+      </p:par>
+    </p:tnLst>
+  </p:timing>
+</p:sld>
+</file>
+
+<file path=ppt/slides/slide12.xml><?xml version="1.0" encoding="utf-8"?>
+<p:sld xmlns:a="http://schemas.openxmlformats.org/drawingml/2006/main" xmlns:r="http://schemas.openxmlformats.org/officeDocument/2006/relationships" xmlns:p="http://schemas.openxmlformats.org/presentationml/2006/main">
+  <p:cSld>
+    <p:spTree>
+      <p:nvGrpSpPr>
+        <p:cNvPr id="1" name=""/>
+        <p:cNvGrpSpPr/>
+        <p:nvPr/>
+      </p:nvGrpSpPr>
+      <p:grpSpPr>
+        <a:xfrm>
+          <a:off x="0" y="0"/>
+          <a:ext cx="0" cy="0"/>
+          <a:chOff x="0" y="0"/>
+          <a:chExt cx="0" cy="0"/>
+        </a:xfrm>
+      </p:grpSpPr>
+      <p:pic>
+        <p:nvPicPr>
+          <p:cNvPr id="10242" name="Picture 2" descr="C:\Users\MaxL\Desktop\New folder\slide10.png"/>
+          <p:cNvPicPr>
+            <a:picLocks noChangeAspect="1" noChangeArrowheads="1"/>
+          </p:cNvPicPr>
+          <p:nvPr/>
+        </p:nvPicPr>
+        <p:blipFill>
+          <a:blip r:embed="rId2">
+            <a:extLst>
+              <a:ext uri="{28A0092B-C50C-407E-A947-70E740481C1C}">
+                <a14:useLocalDpi xmlns:a14="http://schemas.microsoft.com/office/drawing/2010/main" val="0"/>
+              </a:ext>
+            </a:extLst>
+          </a:blip>
+          <a:srcRect/>
+          <a:stretch>
+            <a:fillRect/>
+          </a:stretch>
+        </p:blipFill>
+        <p:spPr bwMode="auto">
+          <a:xfrm>
+            <a:off x="914400" y="0"/>
+            <a:ext cx="6858000" cy="6858000"/>
+          </a:xfrm>
+          <a:prstGeom prst="rect">
+            <a:avLst/>
+          </a:prstGeom>
+          <a:noFill/>
+          <a:extLst>
+            <a:ext uri="{909E8E84-426E-40DD-AFC4-6F175D3DCCD1}">
+              <a14:hiddenFill xmlns:a14="http://schemas.microsoft.com/office/drawing/2010/main">
+                <a:solidFill>
+                  <a:srgbClr val="FFFFFF"/>
+                </a:solidFill>
+              </a14:hiddenFill>
+            </a:ext>
+          </a:extLst>
+        </p:spPr>
+      </p:pic>
+    </p:spTree>
+    <p:extLst>
+      <p:ext uri="{BB962C8B-B14F-4D97-AF65-F5344CB8AC3E}">
+        <p14:creationId xmlns:p14="http://schemas.microsoft.com/office/powerpoint/2010/main" val="2224659091"/>
+      </p:ext>
+    </p:extLst>
+  </p:cSld>
+  <p:clrMapOvr>
+    <a:masterClrMapping/>
+  </p:clrMapOvr>
+  <p:timing>
+    <p:tnLst>
+      <p:par>
+        <p:cTn id="1" dur="indefinite" restart="never" nodeType="tmRoot"/>
+      </p:par>
+    </p:tnLst>
+  </p:timing>
+</p:sld>
+</file>
+
+<file path=ppt/slides/slide13.xml><?xml version="1.0" encoding="utf-8"?>
+<p:sld xmlns:a="http://schemas.openxmlformats.org/drawingml/2006/main" xmlns:r="http://schemas.openxmlformats.org/officeDocument/2006/relationships" xmlns:p="http://schemas.openxmlformats.org/presentationml/2006/main">
+  <p:cSld>
+    <p:spTree>
+      <p:nvGrpSpPr>
+        <p:cNvPr id="1" name=""/>
+        <p:cNvGrpSpPr/>
+        <p:nvPr/>
+      </p:nvGrpSpPr>
+      <p:grpSpPr>
+        <a:xfrm>
+          <a:off x="0" y="0"/>
+          <a:ext cx="0" cy="0"/>
+          <a:chOff x="0" y="0"/>
+          <a:chExt cx="0" cy="0"/>
+        </a:xfrm>
+      </p:grpSpPr>
+      <p:pic>
+        <p:nvPicPr>
+          <p:cNvPr id="11266" name="Picture 2" descr="C:\Users\MaxL\Desktop\New folder\slide11.png"/>
+          <p:cNvPicPr>
+            <a:picLocks noChangeAspect="1" noChangeArrowheads="1"/>
+          </p:cNvPicPr>
+          <p:nvPr/>
+        </p:nvPicPr>
+        <p:blipFill>
+          <a:blip r:embed="rId2">
+            <a:extLst>
+              <a:ext uri="{28A0092B-C50C-407E-A947-70E740481C1C}">
+                <a14:useLocalDpi xmlns:a14="http://schemas.microsoft.com/office/drawing/2010/main" val="0"/>
+              </a:ext>
+            </a:extLst>
+          </a:blip>
+          <a:srcRect/>
+          <a:stretch>
+            <a:fillRect/>
+          </a:stretch>
+        </p:blipFill>
+        <p:spPr bwMode="auto">
+          <a:xfrm>
+            <a:off x="914400" y="0"/>
+            <a:ext cx="6887385" cy="6858000"/>
+          </a:xfrm>
+          <a:prstGeom prst="rect">
+            <a:avLst/>
+          </a:prstGeom>
+          <a:noFill/>
+          <a:extLst>
+            <a:ext uri="{909E8E84-426E-40DD-AFC4-6F175D3DCCD1}">
+              <a14:hiddenFill xmlns:a14="http://schemas.microsoft.com/office/drawing/2010/main">
+                <a:solidFill>
+                  <a:srgbClr val="FFFFFF"/>
+                </a:solidFill>
+              </a14:hiddenFill>
+            </a:ext>
+          </a:extLst>
+        </p:spPr>
+      </p:pic>
+    </p:spTree>
+    <p:extLst>
+      <p:ext uri="{BB962C8B-B14F-4D97-AF65-F5344CB8AC3E}">
+        <p14:creationId xmlns:p14="http://schemas.microsoft.com/office/powerpoint/2010/main" val="2224659091"/>
+      </p:ext>
+    </p:extLst>
+  </p:cSld>
+  <p:clrMapOvr>
+    <a:masterClrMapping/>
+  </p:clrMapOvr>
+  <p:timing>
+    <p:tnLst>
+      <p:par>
+        <p:cTn id="1" dur="indefinite" restart="never" nodeType="tmRoot"/>
+      </p:par>
+    </p:tnLst>
+  </p:timing>
+</p:sld>
+</file>
+
+<file path=ppt/slides/slide14.xml><?xml version="1.0" encoding="utf-8"?>
+<p:sld xmlns:a="http://schemas.openxmlformats.org/drawingml/2006/main" xmlns:r="http://schemas.openxmlformats.org/officeDocument/2006/relationships" xmlns:p="http://schemas.openxmlformats.org/presentationml/2006/main">
+  <p:cSld>
+    <p:spTree>
+      <p:nvGrpSpPr>
+        <p:cNvPr id="1" name=""/>
+        <p:cNvGrpSpPr/>
+        <p:nvPr/>
+      </p:nvGrpSpPr>
+      <p:grpSpPr>
+        <a:xfrm>
+          <a:off x="0" y="0"/>
+          <a:ext cx="0" cy="0"/>
+          <a:chOff x="0" y="0"/>
+          <a:chExt cx="0" cy="0"/>
+        </a:xfrm>
+      </p:grpSpPr>
+      <p:pic>
+        <p:nvPicPr>
+          <p:cNvPr id="12290" name="Picture 2" descr="C:\Users\MaxL\Desktop\New folder\slide12.png"/>
+          <p:cNvPicPr>
+            <a:picLocks noChangeAspect="1" noChangeArrowheads="1"/>
+          </p:cNvPicPr>
+          <p:nvPr/>
+        </p:nvPicPr>
+        <p:blipFill>
+          <a:blip r:embed="rId2">
+            <a:extLst>
+              <a:ext uri="{28A0092B-C50C-407E-A947-70E740481C1C}">
+                <a14:useLocalDpi xmlns:a14="http://schemas.microsoft.com/office/drawing/2010/main" val="0"/>
+              </a:ext>
+            </a:extLst>
+          </a:blip>
+          <a:srcRect/>
+          <a:stretch>
+            <a:fillRect/>
+          </a:stretch>
+        </p:blipFill>
+        <p:spPr bwMode="auto">
+          <a:xfrm>
+            <a:off x="914400" y="0"/>
+            <a:ext cx="6867710" cy="6858000"/>
+          </a:xfrm>
+          <a:prstGeom prst="rect">
+            <a:avLst/>
+          </a:prstGeom>
+          <a:noFill/>
+          <a:extLst>
+            <a:ext uri="{909E8E84-426E-40DD-AFC4-6F175D3DCCD1}">
+              <a14:hiddenFill xmlns:a14="http://schemas.microsoft.com/office/drawing/2010/main">
+                <a:solidFill>
+                  <a:srgbClr val="FFFFFF"/>
+                </a:solidFill>
+              </a14:hiddenFill>
+            </a:ext>
+          </a:extLst>
+        </p:spPr>
+      </p:pic>
+    </p:spTree>
+    <p:extLst>
+      <p:ext uri="{BB962C8B-B14F-4D97-AF65-F5344CB8AC3E}">
+        <p14:creationId xmlns:p14="http://schemas.microsoft.com/office/powerpoint/2010/main" val="2224659091"/>
+      </p:ext>
+    </p:extLst>
+  </p:cSld>
+  <p:clrMapOvr>
+    <a:masterClrMapping/>
+  </p:clrMapOvr>
+  <p:timing>
+    <p:tnLst>
+      <p:par>
+        <p:cTn id="1" dur="indefinite" restart="never" nodeType="tmRoot"/>
+      </p:par>
+    </p:tnLst>
+  </p:timing>
+</p:sld>
+</file>
+
+<file path=ppt/slides/slide2.xml><?xml version="1.0" encoding="utf-8"?>
+<p:sld xmlns:a="http://schemas.openxmlformats.org/drawingml/2006/main" xmlns:r="http://schemas.openxmlformats.org/officeDocument/2006/relationships" xmlns:p="http://schemas.openxmlformats.org/presentationml/2006/main">
+  <p:cSld>
+    <p:spTree>
+      <p:nvGrpSpPr>
+        <p:cNvPr id="1" name=""/>
+        <p:cNvGrpSpPr/>
+        <p:nvPr/>
+      </p:nvGrpSpPr>
+      <p:grpSpPr>
+        <a:xfrm>
+          <a:off x="0" y="0"/>
+          <a:ext cx="0" cy="0"/>
+          <a:chOff x="0" y="0"/>
+          <a:chExt cx="0" cy="0"/>
+        </a:xfrm>
+      </p:grpSpPr>
+      <p:pic>
+        <p:nvPicPr>
+          <p:cNvPr id="1026" name="Picture 2" descr="C:\Users\MaxL\Desktop\New folder\slide1.png"/>
+          <p:cNvPicPr>
+            <a:picLocks noChangeAspect="1" noChangeArrowheads="1"/>
+          </p:cNvPicPr>
+          <p:nvPr/>
+        </p:nvPicPr>
+        <p:blipFill>
+          <a:blip r:embed="rId2">
+            <a:extLst>
+              <a:ext uri="{28A0092B-C50C-407E-A947-70E740481C1C}">
+                <a14:useLocalDpi xmlns:a14="http://schemas.microsoft.com/office/drawing/2010/main" val="0"/>
+              </a:ext>
+            </a:extLst>
+          </a:blip>
+          <a:srcRect/>
+          <a:stretch>
+            <a:fillRect/>
+          </a:stretch>
+        </p:blipFill>
+        <p:spPr bwMode="auto">
+          <a:xfrm>
+            <a:off x="914400" y="0"/>
+            <a:ext cx="6858000" cy="6867684"/>
+          </a:xfrm>
+          <a:prstGeom prst="rect">
+            <a:avLst/>
+          </a:prstGeom>
+          <a:noFill/>
+          <a:extLst>
+            <a:ext uri="{909E8E84-426E-40DD-AFC4-6F175D3DCCD1}">
+              <a14:hiddenFill xmlns:a14="http://schemas.microsoft.com/office/drawing/2010/main">
+                <a:solidFill>
+                  <a:srgbClr val="FFFFFF"/>
+                </a:solidFill>
+              </a14:hiddenFill>
+            </a:ext>
+          </a:extLst>
+        </p:spPr>
+      </p:pic>
+    </p:spTree>
+    <p:extLst>
+      <p:ext uri="{BB962C8B-B14F-4D97-AF65-F5344CB8AC3E}">
+        <p14:creationId xmlns:p14="http://schemas.microsoft.com/office/powerpoint/2010/main" val="1343128696"/>
+      </p:ext>
+    </p:extLst>
+  </p:cSld>
+  <p:clrMapOvr>
+    <a:masterClrMapping/>
+  </p:clrMapOvr>
+  <p:timing>
+    <p:tnLst>
+      <p:par>
+        <p:cTn id="1" dur="indefinite" restart="never" nodeType="tmRoot"/>
+      </p:par>
+    </p:tnLst>
+  </p:timing>
+</p:sld>
+</file>
+
+<file path=ppt/slides/slide3.xml><?xml version="1.0" encoding="utf-8"?>
+<p:sld xmlns:a="http://schemas.openxmlformats.org/drawingml/2006/main" xmlns:r="http://schemas.openxmlformats.org/officeDocument/2006/relationships" xmlns:p="http://schemas.openxmlformats.org/presentationml/2006/main">
+  <p:cSld>
+    <p:spTree>
+      <p:nvGrpSpPr>
+        <p:cNvPr id="1" name=""/>
+        <p:cNvGrpSpPr/>
+        <p:nvPr/>
+      </p:nvGrpSpPr>
+      <p:grpSpPr>
+        <a:xfrm>
+          <a:off x="0" y="0"/>
+          <a:ext cx="0" cy="0"/>
+          <a:chOff x="0" y="0"/>
+          <a:chExt cx="0" cy="0"/>
+        </a:xfrm>
+      </p:grpSpPr>
+      <p:pic>
+        <p:nvPicPr>
+          <p:cNvPr id="2050" name="Picture 2" descr="C:\Users\MaxL\Desktop\New folder\slide2.png"/>
+          <p:cNvPicPr>
+            <a:picLocks noChangeAspect="1" noChangeArrowheads="1"/>
+          </p:cNvPicPr>
+          <p:nvPr/>
+        </p:nvPicPr>
+        <p:blipFill>
+          <a:blip r:embed="rId2">
+            <a:extLst>
+              <a:ext uri="{28A0092B-C50C-407E-A947-70E740481C1C}">
+                <a14:useLocalDpi xmlns:a14="http://schemas.microsoft.com/office/drawing/2010/main" val="0"/>
+              </a:ext>
+            </a:extLst>
+          </a:blip>
+          <a:srcRect/>
+          <a:stretch>
+            <a:fillRect/>
+          </a:stretch>
+        </p:blipFill>
+        <p:spPr bwMode="auto">
+          <a:xfrm>
+            <a:off x="914400" y="0"/>
+            <a:ext cx="6934200" cy="6904989"/>
+          </a:xfrm>
+          <a:prstGeom prst="rect">
+            <a:avLst/>
+          </a:prstGeom>
+          <a:noFill/>
+          <a:extLst>
+            <a:ext uri="{909E8E84-426E-40DD-AFC4-6F175D3DCCD1}">
+              <a14:hiddenFill xmlns:a14="http://schemas.microsoft.com/office/drawing/2010/main">
+                <a:solidFill>
+                  <a:srgbClr val="FFFFFF"/>
+                </a:solidFill>
+              </a14:hiddenFill>
+            </a:ext>
+          </a:extLst>
+        </p:spPr>
+      </p:pic>
+    </p:spTree>
+    <p:extLst>
+      <p:ext uri="{BB962C8B-B14F-4D97-AF65-F5344CB8AC3E}">
+        <p14:creationId xmlns:p14="http://schemas.microsoft.com/office/powerpoint/2010/main" val="2224659091"/>
+      </p:ext>
+    </p:extLst>
+  </p:cSld>
+  <p:clrMapOvr>
+    <a:masterClrMapping/>
+  </p:clrMapOvr>
+  <p:timing>
+    <p:tnLst>
+      <p:par>
+        <p:cTn id="1" dur="indefinite" restart="never" nodeType="tmRoot"/>
+      </p:par>
+    </p:tnLst>
+  </p:timing>
+</p:sld>
+</file>
+
+<file path=ppt/slides/slide4.xml><?xml version="1.0" encoding="utf-8"?>
+<p:sld xmlns:a="http://schemas.openxmlformats.org/drawingml/2006/main" xmlns:r="http://schemas.openxmlformats.org/officeDocument/2006/relationships" xmlns:p="http://schemas.openxmlformats.org/presentationml/2006/main">
+  <p:cSld>
+    <p:spTree>
+      <p:nvGrpSpPr>
+        <p:cNvPr id="1" name=""/>
+        <p:cNvGrpSpPr/>
+        <p:nvPr/>
+      </p:nvGrpSpPr>
+      <p:grpSpPr>
+        <a:xfrm>
+          <a:off x="0" y="0"/>
+          <a:ext cx="0" cy="0"/>
+          <a:chOff x="0" y="0"/>
+          <a:chExt cx="0" cy="0"/>
+        </a:xfrm>
+      </p:grpSpPr>
+      <p:pic>
+        <p:nvPicPr>
+          <p:cNvPr id="13314" name="Picture 2" descr="C:\Users\MaxL\Desktop\New folder\slide3.png"/>
+          <p:cNvPicPr>
+            <a:picLocks noChangeAspect="1" noChangeArrowheads="1"/>
+          </p:cNvPicPr>
+          <p:nvPr/>
+        </p:nvPicPr>
+        <p:blipFill>
+          <a:blip r:embed="rId2">
+            <a:extLst>
+              <a:ext uri="{28A0092B-C50C-407E-A947-70E740481C1C}">
+                <a14:useLocalDpi xmlns:a14="http://schemas.microsoft.com/office/drawing/2010/main" val="0"/>
+              </a:ext>
+            </a:extLst>
+          </a:blip>
+          <a:srcRect/>
+          <a:stretch>
+            <a:fillRect/>
+          </a:stretch>
+        </p:blipFill>
+        <p:spPr bwMode="auto">
+          <a:xfrm>
+            <a:off x="914400" y="0"/>
+            <a:ext cx="6858000" cy="6867740"/>
+          </a:xfrm>
+          <a:prstGeom prst="rect">
+            <a:avLst/>
+          </a:prstGeom>
+          <a:noFill/>
+          <a:extLst>
+            <a:ext uri="{909E8E84-426E-40DD-AFC4-6F175D3DCCD1}">
+              <a14:hiddenFill xmlns:a14="http://schemas.microsoft.com/office/drawing/2010/main">
+                <a:solidFill>
+                  <a:srgbClr val="FFFFFF"/>
+                </a:solidFill>
+              </a14:hiddenFill>
+            </a:ext>
+          </a:extLst>
+        </p:spPr>
+      </p:pic>
+    </p:spTree>
+    <p:extLst>
+      <p:ext uri="{BB962C8B-B14F-4D97-AF65-F5344CB8AC3E}">
+        <p14:creationId xmlns:p14="http://schemas.microsoft.com/office/powerpoint/2010/main" val="2224659091"/>
+      </p:ext>
+    </p:extLst>
+  </p:cSld>
+  <p:clrMapOvr>
+    <a:masterClrMapping/>
+  </p:clrMapOvr>
+  <p:timing>
+    <p:tnLst>
+      <p:par>
+        <p:cTn id="1" dur="indefinite" restart="never" nodeType="tmRoot"/>
+      </p:par>
+    </p:tnLst>
+  </p:timing>
+</p:sld>
+</file>
+
+<file path=ppt/slides/slide5.xml><?xml version="1.0" encoding="utf-8"?>
+<p:sld xmlns:a="http://schemas.openxmlformats.org/drawingml/2006/main" xmlns:r="http://schemas.openxmlformats.org/officeDocument/2006/relationships" xmlns:p="http://schemas.openxmlformats.org/presentationml/2006/main">
+  <p:cSld>
+    <p:spTree>
+      <p:nvGrpSpPr>
+        <p:cNvPr id="1" name=""/>
+        <p:cNvGrpSpPr/>
+        <p:nvPr/>
+      </p:nvGrpSpPr>
+      <p:grpSpPr>
+        <a:xfrm>
+          <a:off x="0" y="0"/>
+          <a:ext cx="0" cy="0"/>
+          <a:chOff x="0" y="0"/>
+          <a:chExt cx="0" cy="0"/>
+        </a:xfrm>
+      </p:grpSpPr>
+      <p:pic>
+        <p:nvPicPr>
+          <p:cNvPr id="3074" name="Picture 2" descr="C:\Users\MaxL\Desktop\New folder\slide3.png"/>
+          <p:cNvPicPr>
+            <a:picLocks noChangeAspect="1" noChangeArrowheads="1"/>
+          </p:cNvPicPr>
+          <p:nvPr/>
+        </p:nvPicPr>
+        <p:blipFill>
+          <a:blip r:embed="rId2">
+            <a:extLst>
+              <a:ext uri="{28A0092B-C50C-407E-A947-70E740481C1C}">
+                <a14:useLocalDpi xmlns:a14="http://schemas.microsoft.com/office/drawing/2010/main" val="0"/>
+              </a:ext>
+            </a:extLst>
+          </a:blip>
+          <a:srcRect/>
+          <a:stretch>
+            <a:fillRect/>
+          </a:stretch>
+        </p:blipFill>
+        <p:spPr bwMode="auto">
+          <a:xfrm>
+            <a:off x="914400" y="229"/>
+            <a:ext cx="6887029" cy="6857771"/>
+          </a:xfrm>
+          <a:prstGeom prst="rect">
+            <a:avLst/>
+          </a:prstGeom>
+          <a:noFill/>
+          <a:extLst>
+            <a:ext uri="{909E8E84-426E-40DD-AFC4-6F175D3DCCD1}">
+              <a14:hiddenFill xmlns:a14="http://schemas.microsoft.com/office/drawing/2010/main">
+                <a:solidFill>
+                  <a:srgbClr val="FFFFFF"/>
+                </a:solidFill>
+              </a14:hiddenFill>
+            </a:ext>
+          </a:extLst>
+        </p:spPr>
+      </p:pic>
+    </p:spTree>
+    <p:extLst>
+      <p:ext uri="{BB962C8B-B14F-4D97-AF65-F5344CB8AC3E}">
+        <p14:creationId xmlns:p14="http://schemas.microsoft.com/office/powerpoint/2010/main" val="2224659091"/>
+      </p:ext>
+    </p:extLst>
+  </p:cSld>
+  <p:clrMapOvr>
+    <a:masterClrMapping/>
+  </p:clrMapOvr>
+  <p:timing>
+    <p:tnLst>
+      <p:par>
+        <p:cTn id="1" dur="indefinite" restart="never" nodeType="tmRoot"/>
+      </p:par>
+    </p:tnLst>
+  </p:timing>
+</p:sld>
+</file>
+
+<file path=ppt/slides/slide6.xml><?xml version="1.0" encoding="utf-8"?>
+<p:sld xmlns:a="http://schemas.openxmlformats.org/drawingml/2006/main" xmlns:r="http://schemas.openxmlformats.org/officeDocument/2006/relationships" xmlns:p="http://schemas.openxmlformats.org/presentationml/2006/main">
+  <p:cSld>
+    <p:spTree>
+      <p:nvGrpSpPr>
+        <p:cNvPr id="1" name=""/>
+        <p:cNvGrpSpPr/>
+        <p:nvPr/>
+      </p:nvGrpSpPr>
+      <p:grpSpPr>
+        <a:xfrm>
+          <a:off x="0" y="0"/>
+          <a:ext cx="0" cy="0"/>
+          <a:chOff x="0" y="0"/>
+          <a:chExt cx="0" cy="0"/>
+        </a:xfrm>
+      </p:grpSpPr>
+      <p:pic>
+        <p:nvPicPr>
+          <p:cNvPr id="4100" name="Picture 4" descr="C:\Users\MaxL\Desktop\New folder\slide5.png"/>
+          <p:cNvPicPr>
+            <a:picLocks noChangeAspect="1" noChangeArrowheads="1"/>
+          </p:cNvPicPr>
+          <p:nvPr/>
+        </p:nvPicPr>
+        <p:blipFill>
+          <a:blip r:embed="rId2">
+            <a:extLst>
+              <a:ext uri="{28A0092B-C50C-407E-A947-70E740481C1C}">
+                <a14:useLocalDpi xmlns:a14="http://schemas.microsoft.com/office/drawing/2010/main" val="0"/>
+              </a:ext>
+            </a:extLst>
+          </a:blip>
+          <a:srcRect/>
+          <a:stretch>
+            <a:fillRect/>
+          </a:stretch>
+        </p:blipFill>
+        <p:spPr bwMode="auto">
+          <a:xfrm>
+            <a:off x="914400" y="0"/>
+            <a:ext cx="6858000" cy="6858000"/>
+          </a:xfrm>
+          <a:prstGeom prst="rect">
+            <a:avLst/>
+          </a:prstGeom>
+          <a:noFill/>
+          <a:extLst>
+            <a:ext uri="{909E8E84-426E-40DD-AFC4-6F175D3DCCD1}">
+              <a14:hiddenFill xmlns:a14="http://schemas.microsoft.com/office/drawing/2010/main">
+                <a:solidFill>
+                  <a:srgbClr val="FFFFFF"/>
+                </a:solidFill>
+              </a14:hiddenFill>
+            </a:ext>
+          </a:extLst>
+        </p:spPr>
+      </p:pic>
+    </p:spTree>
+    <p:extLst>
+      <p:ext uri="{BB962C8B-B14F-4D97-AF65-F5344CB8AC3E}">
+        <p14:creationId xmlns:p14="http://schemas.microsoft.com/office/powerpoint/2010/main" val="2224659091"/>
+      </p:ext>
+    </p:extLst>
+  </p:cSld>
+  <p:clrMapOvr>
+    <a:masterClrMapping/>
+  </p:clrMapOvr>
+  <p:timing>
+    <p:tnLst>
+      <p:par>
+        <p:cTn id="1" dur="indefinite" restart="never" nodeType="tmRoot"/>
+      </p:par>
+    </p:tnLst>
+  </p:timing>
+</p:sld>
+</file>
+
+<file path=ppt/slides/slide7.xml><?xml version="1.0" encoding="utf-8"?>
+<p:sld xmlns:a="http://schemas.openxmlformats.org/drawingml/2006/main" xmlns:r="http://schemas.openxmlformats.org/officeDocument/2006/relationships" xmlns:p="http://schemas.openxmlformats.org/presentationml/2006/main">
+  <p:cSld>
+    <p:spTree>
+      <p:nvGrpSpPr>
+        <p:cNvPr id="1" name=""/>
+        <p:cNvGrpSpPr/>
+        <p:nvPr/>
+      </p:nvGrpSpPr>
+      <p:grpSpPr>
+        <a:xfrm>
+          <a:off x="0" y="0"/>
+          <a:ext cx="0" cy="0"/>
+          <a:chOff x="0" y="0"/>
+          <a:chExt cx="0" cy="0"/>
+        </a:xfrm>
+      </p:grpSpPr>
+      <p:pic>
+        <p:nvPicPr>
+          <p:cNvPr id="5124" name="Picture 4" descr="C:\Users\MaxL\Desktop\New folder\slide6.png"/>
+          <p:cNvPicPr>
+            <a:picLocks noChangeAspect="1" noChangeArrowheads="1"/>
+          </p:cNvPicPr>
+          <p:nvPr/>
+        </p:nvPicPr>
+        <p:blipFill>
+          <a:blip r:embed="rId2">
+            <a:extLst>
+              <a:ext uri="{28A0092B-C50C-407E-A947-70E740481C1C}">
+                <a14:useLocalDpi xmlns:a14="http://schemas.microsoft.com/office/drawing/2010/main" val="0"/>
+              </a:ext>
+            </a:extLst>
+          </a:blip>
+          <a:srcRect/>
+          <a:stretch>
+            <a:fillRect/>
+          </a:stretch>
+        </p:blipFill>
+        <p:spPr bwMode="auto">
+          <a:xfrm>
+            <a:off x="914400" y="0"/>
+            <a:ext cx="6877533" cy="6858000"/>
+          </a:xfrm>
+          <a:prstGeom prst="rect">
+            <a:avLst/>
+          </a:prstGeom>
+          <a:noFill/>
+          <a:extLst>
+            <a:ext uri="{909E8E84-426E-40DD-AFC4-6F175D3DCCD1}">
+              <a14:hiddenFill xmlns:a14="http://schemas.microsoft.com/office/drawing/2010/main">
+                <a:solidFill>
+                  <a:srgbClr val="FFFFFF"/>
+                </a:solidFill>
+              </a14:hiddenFill>
+            </a:ext>
+          </a:extLst>
+        </p:spPr>
+      </p:pic>
+    </p:spTree>
+    <p:extLst>
+      <p:ext uri="{BB962C8B-B14F-4D97-AF65-F5344CB8AC3E}">
+        <p14:creationId xmlns:p14="http://schemas.microsoft.com/office/powerpoint/2010/main" val="2224659091"/>
+      </p:ext>
+    </p:extLst>
+  </p:cSld>
+  <p:clrMapOvr>
+    <a:masterClrMapping/>
+  </p:clrMapOvr>
+  <p:timing>
+    <p:tnLst>
+      <p:par>
+        <p:cTn id="1" dur="indefinite" restart="never" nodeType="tmRoot"/>
+      </p:par>
+    </p:tnLst>
+  </p:timing>
+</p:sld>
+</file>
+
+<file path=ppt/slides/slide8.xml><?xml version="1.0" encoding="utf-8"?>
+<p:sld xmlns:a="http://schemas.openxmlformats.org/drawingml/2006/main" xmlns:r="http://schemas.openxmlformats.org/officeDocument/2006/relationships" xmlns:p="http://schemas.openxmlformats.org/presentationml/2006/main">
+  <p:cSld>
+    <p:spTree>
+      <p:nvGrpSpPr>
+        <p:cNvPr id="1" name=""/>
+        <p:cNvGrpSpPr/>
+        <p:nvPr/>
+      </p:nvGrpSpPr>
+      <p:grpSpPr>
+        <a:xfrm>
+          <a:off x="0" y="0"/>
+          <a:ext cx="0" cy="0"/>
+          <a:chOff x="0" y="0"/>
+          <a:chExt cx="0" cy="0"/>
+        </a:xfrm>
+      </p:grpSpPr>
+      <p:pic>
+        <p:nvPicPr>
+          <p:cNvPr id="6146" name="Picture 2" descr="C:\Users\MaxL\Desktop\New folder\slide6.png"/>
+          <p:cNvPicPr>
+            <a:picLocks noChangeAspect="1" noChangeArrowheads="1"/>
+          </p:cNvPicPr>
+          <p:nvPr/>
+        </p:nvPicPr>
+        <p:blipFill>
+          <a:blip r:embed="rId2">
+            <a:extLst>
+              <a:ext uri="{28A0092B-C50C-407E-A947-70E740481C1C}">
+                <a14:useLocalDpi xmlns:a14="http://schemas.microsoft.com/office/drawing/2010/main" val="0"/>
+              </a:ext>
+            </a:extLst>
+          </a:blip>
+          <a:srcRect/>
+          <a:stretch>
+            <a:fillRect/>
+          </a:stretch>
+        </p:blipFill>
+        <p:spPr bwMode="auto">
+          <a:xfrm>
+            <a:off x="914400" y="0"/>
+            <a:ext cx="6896902" cy="6858000"/>
+          </a:xfrm>
+          <a:prstGeom prst="rect">
+            <a:avLst/>
+          </a:prstGeom>
+          <a:noFill/>
+          <a:extLst>
+            <a:ext uri="{909E8E84-426E-40DD-AFC4-6F175D3DCCD1}">
+              <a14:hiddenFill xmlns:a14="http://schemas.microsoft.com/office/drawing/2010/main">
+                <a:solidFill>
+                  <a:srgbClr val="FFFFFF"/>
+                </a:solidFill>
+              </a14:hiddenFill>
+            </a:ext>
+          </a:extLst>
+        </p:spPr>
+      </p:pic>
+    </p:spTree>
+    <p:extLst>
+      <p:ext uri="{BB962C8B-B14F-4D97-AF65-F5344CB8AC3E}">
+        <p14:creationId xmlns:p14="http://schemas.microsoft.com/office/powerpoint/2010/main" val="2224659091"/>
+      </p:ext>
+    </p:extLst>
+  </p:cSld>
+  <p:clrMapOvr>
+    <a:masterClrMapping/>
+  </p:clrMapOvr>
+  <p:timing>
+    <p:tnLst>
+      <p:par>
+        <p:cTn id="1" dur="indefinite" restart="never" nodeType="tmRoot"/>
+      </p:par>
+    </p:tnLst>
+  </p:timing>
+</p:sld>
+</file>
+
+<file path=ppt/slides/slide9.xml><?xml version="1.0" encoding="utf-8"?>
+<p:sld xmlns:a="http://schemas.openxmlformats.org/drawingml/2006/main" xmlns:r="http://schemas.openxmlformats.org/officeDocument/2006/relationships" xmlns:p="http://schemas.openxmlformats.org/presentationml/2006/main">
+  <p:cSld>
+    <p:spTree>
+      <p:nvGrpSpPr>
+        <p:cNvPr id="1" name=""/>
+        <p:cNvGrpSpPr/>
+        <p:nvPr/>
+      </p:nvGrpSpPr>
+      <p:grpSpPr>
+        <a:xfrm>
+          <a:off x="0" y="0"/>
+          <a:ext cx="0" cy="0"/>
+          <a:chOff x="0" y="0"/>
+          <a:chExt cx="0" cy="0"/>
+        </a:xfrm>
+      </p:grpSpPr>
+      <p:pic>
+        <p:nvPicPr>
+          <p:cNvPr id="7170" name="Picture 2" descr="C:\Users\MaxL\Desktop\New folder\slide7.png"/>
+          <p:cNvPicPr>
+            <a:picLocks noChangeAspect="1" noChangeArrowheads="1"/>
+          </p:cNvPicPr>
+          <p:nvPr/>
+        </p:nvPicPr>
+        <p:blipFill>
+          <a:blip r:embed="rId2">
+            <a:extLst>
+              <a:ext uri="{28A0092B-C50C-407E-A947-70E740481C1C}">
+                <a14:useLocalDpi xmlns:a14="http://schemas.microsoft.com/office/drawing/2010/main" val="0"/>
+              </a:ext>
+            </a:extLst>
+          </a:blip>
+          <a:srcRect/>
+          <a:stretch>
+            <a:fillRect/>
+          </a:stretch>
+        </p:blipFill>
+        <p:spPr bwMode="auto">
+          <a:xfrm>
+            <a:off x="914400" y="0"/>
+            <a:ext cx="6877506" cy="6858000"/>
+          </a:xfrm>
+          <a:prstGeom prst="rect">
+            <a:avLst/>
+          </a:prstGeom>
+          <a:noFill/>
+          <a:extLst>
+            <a:ext uri="{909E8E84-426E-40DD-AFC4-6F175D3DCCD1}">
+              <a14:hiddenFill xmlns:a14="http://schemas.microsoft.com/office/drawing/2010/main">
+                <a:solidFill>
+                  <a:srgbClr val="FFFFFF"/>
+                </a:solidFill>
+              </a14:hiddenFill>
+            </a:ext>
+          </a:extLst>
+        </p:spPr>
+      </p:pic>
+    </p:spTree>
+    <p:extLst>
+      <p:ext uri="{BB962C8B-B14F-4D97-AF65-F5344CB8AC3E}">
+        <p14:creationId xmlns:p14="http://schemas.microsoft.com/office/powerpoint/2010/main" val="2224659091"/>
+      </p:ext>
+    </p:extLst>
+  </p:cSld>
+  <p:clrMapOvr>
+    <a:masterClrMapping/>
+  </p:clrMapOvr>
+  <p:timing>
+    <p:tnLst>
+      <p:par>
+        <p:cTn id="1" dur="indefinite" restart="never" nodeType="tmRoot"/>
+      </p:par>
+    </p:tnLst>
+  </p:timing>
 </p:sld>
 </file>
 

</xml_diff>